<commit_message>
Exam 1 - Solutions
</commit_message>
<xml_diff>
--- a/Slides/Calibración.pptx
+++ b/Slides/Calibración.pptx
@@ -134,15 +134,57 @@
       </a:defRPr>
     </a:lvl9pPr>
   </p:defaultTextStyle>
+  <p:extLst>
+    <p:ext uri="{EFAFB233-063F-42B5-8137-9DF3F51BA10A}">
+      <p15:sldGuideLst xmlns:p15="http://schemas.microsoft.com/office/powerpoint/2012/main"/>
+    </p:ext>
+  </p:extLst>
 </p:presentation>
 </file>
 
 <file path=ppt/revisionInfo.xml><?xml version="1.0" encoding="utf-8"?>
 <p1510:revInfo xmlns:a="http://schemas.openxmlformats.org/drawingml/2006/main" xmlns:r="http://schemas.openxmlformats.org/officeDocument/2006/relationships" xmlns:p1510="http://schemas.microsoft.com/office/powerpoint/2015/10/main">
   <p1510:revLst>
-    <p1510:client id="{3F6D03D6-1BF9-D049-8ADD-4AB99EBDF796}" v="1293" dt="2024-05-07T03:55:28.956"/>
+    <p1510:client id="{3F6D03D6-1BF9-D049-8ADD-4AB99EBDF796}" v="1299" dt="2024-05-10T22:06:57.763"/>
   </p1510:revLst>
 </p1510:revInfo>
+</file>
+
+<file path=ppt/changesInfos/changesInfo1.xml><?xml version="1.0" encoding="utf-8"?>
+<pc:chgInfo xmlns:a="http://schemas.openxmlformats.org/drawingml/2006/main" xmlns:r="http://schemas.openxmlformats.org/officeDocument/2006/relationships" xmlns:ac="http://schemas.microsoft.com/office/drawing/2013/main/command" xmlns:pc="http://schemas.microsoft.com/office/powerpoint/2013/main/command">
+  <pc:docChgLst>
+    <pc:chgData name="Carlos Rondón Moreno" userId="3eb52eec8da34d1e" providerId="LiveId" clId="{3F6D03D6-1BF9-D049-8ADD-4AB99EBDF796}"/>
+    <pc:docChg chg="undo custSel modSld">
+      <pc:chgData name="Carlos Rondón Moreno" userId="3eb52eec8da34d1e" providerId="LiveId" clId="{3F6D03D6-1BF9-D049-8ADD-4AB99EBDF796}" dt="2024-05-10T22:06:58.283" v="7" actId="11529"/>
+      <pc:docMkLst>
+        <pc:docMk/>
+      </pc:docMkLst>
+      <pc:sldChg chg="addSp delSp modSp mod">
+        <pc:chgData name="Carlos Rondón Moreno" userId="3eb52eec8da34d1e" providerId="LiveId" clId="{3F6D03D6-1BF9-D049-8ADD-4AB99EBDF796}" dt="2024-05-10T22:06:58.283" v="7" actId="11529"/>
+        <pc:sldMkLst>
+          <pc:docMk/>
+          <pc:sldMk cId="591394009" sldId="271"/>
+        </pc:sldMkLst>
+        <pc:spChg chg="add del mod">
+          <ac:chgData name="Carlos Rondón Moreno" userId="3eb52eec8da34d1e" providerId="LiveId" clId="{3F6D03D6-1BF9-D049-8ADD-4AB99EBDF796}" dt="2024-05-10T22:06:58.283" v="7" actId="11529"/>
+          <ac:spMkLst>
+            <pc:docMk/>
+            <pc:sldMk cId="591394009" sldId="271"/>
+            <ac:spMk id="6" creationId="{E48793B4-9548-B175-AFAE-C5B4380A2649}"/>
+          </ac:spMkLst>
+        </pc:spChg>
+        <pc:spChg chg="add mod">
+          <ac:chgData name="Carlos Rondón Moreno" userId="3eb52eec8da34d1e" providerId="LiveId" clId="{3F6D03D6-1BF9-D049-8ADD-4AB99EBDF796}" dt="2024-05-10T22:06:57.763" v="6" actId="767"/>
+          <ac:spMkLst>
+            <pc:docMk/>
+            <pc:sldMk cId="591394009" sldId="271"/>
+            <ac:spMk id="8" creationId="{BC55829A-E15D-A8C2-F98E-53CB028FB618}"/>
+          </ac:spMkLst>
+        </pc:spChg>
+      </pc:sldChg>
+    </pc:docChg>
+  </pc:docChgLst>
+</pc:chgInfo>
 </file>
 
 <file path=ppt/notesMasters/notesMaster1.xml><?xml version="1.0" encoding="utf-8"?>
@@ -227,7 +269,7 @@
           <a:p>
             <a:fld id="{89BE63A5-4489-4448-BC39-0DF0866C95E9}" type="datetimeFigureOut">
               <a:rPr lang="en-CL" smtClean="0"/>
-              <a:t>06-05-24</a:t>
+              <a:t>10-05-24</a:t>
             </a:fld>
             <a:endParaRPr lang="en-CL"/>
           </a:p>
@@ -728,7 +770,7 @@
           <a:p>
             <a:fld id="{671E9371-6245-DB40-8CD7-B15A4911B4DF}" type="datetimeFigureOut">
               <a:rPr lang="en-CL" smtClean="0"/>
-              <a:t>06-05-24</a:t>
+              <a:t>10-05-24</a:t>
             </a:fld>
             <a:endParaRPr lang="en-CL"/>
           </a:p>
@@ -928,7 +970,7 @@
           <a:p>
             <a:fld id="{671E9371-6245-DB40-8CD7-B15A4911B4DF}" type="datetimeFigureOut">
               <a:rPr lang="en-CL" smtClean="0"/>
-              <a:t>06-05-24</a:t>
+              <a:t>10-05-24</a:t>
             </a:fld>
             <a:endParaRPr lang="en-CL"/>
           </a:p>
@@ -1138,7 +1180,7 @@
           <a:p>
             <a:fld id="{671E9371-6245-DB40-8CD7-B15A4911B4DF}" type="datetimeFigureOut">
               <a:rPr lang="en-CL" smtClean="0"/>
-              <a:t>06-05-24</a:t>
+              <a:t>10-05-24</a:t>
             </a:fld>
             <a:endParaRPr lang="en-CL"/>
           </a:p>
@@ -1338,7 +1380,7 @@
           <a:p>
             <a:fld id="{671E9371-6245-DB40-8CD7-B15A4911B4DF}" type="datetimeFigureOut">
               <a:rPr lang="en-CL" smtClean="0"/>
-              <a:t>06-05-24</a:t>
+              <a:t>10-05-24</a:t>
             </a:fld>
             <a:endParaRPr lang="en-CL"/>
           </a:p>
@@ -1614,7 +1656,7 @@
           <a:p>
             <a:fld id="{671E9371-6245-DB40-8CD7-B15A4911B4DF}" type="datetimeFigureOut">
               <a:rPr lang="en-CL" smtClean="0"/>
-              <a:t>06-05-24</a:t>
+              <a:t>10-05-24</a:t>
             </a:fld>
             <a:endParaRPr lang="en-CL"/>
           </a:p>
@@ -1882,7 +1924,7 @@
           <a:p>
             <a:fld id="{671E9371-6245-DB40-8CD7-B15A4911B4DF}" type="datetimeFigureOut">
               <a:rPr lang="en-CL" smtClean="0"/>
-              <a:t>06-05-24</a:t>
+              <a:t>10-05-24</a:t>
             </a:fld>
             <a:endParaRPr lang="en-CL"/>
           </a:p>
@@ -2297,7 +2339,7 @@
           <a:p>
             <a:fld id="{671E9371-6245-DB40-8CD7-B15A4911B4DF}" type="datetimeFigureOut">
               <a:rPr lang="en-CL" smtClean="0"/>
-              <a:t>06-05-24</a:t>
+              <a:t>10-05-24</a:t>
             </a:fld>
             <a:endParaRPr lang="en-CL"/>
           </a:p>
@@ -2439,7 +2481,7 @@
           <a:p>
             <a:fld id="{671E9371-6245-DB40-8CD7-B15A4911B4DF}" type="datetimeFigureOut">
               <a:rPr lang="en-CL" smtClean="0"/>
-              <a:t>06-05-24</a:t>
+              <a:t>10-05-24</a:t>
             </a:fld>
             <a:endParaRPr lang="en-CL"/>
           </a:p>
@@ -2552,7 +2594,7 @@
           <a:p>
             <a:fld id="{671E9371-6245-DB40-8CD7-B15A4911B4DF}" type="datetimeFigureOut">
               <a:rPr lang="en-CL" smtClean="0"/>
-              <a:t>06-05-24</a:t>
+              <a:t>10-05-24</a:t>
             </a:fld>
             <a:endParaRPr lang="en-CL"/>
           </a:p>
@@ -2865,7 +2907,7 @@
           <a:p>
             <a:fld id="{671E9371-6245-DB40-8CD7-B15A4911B4DF}" type="datetimeFigureOut">
               <a:rPr lang="en-CL" smtClean="0"/>
-              <a:t>06-05-24</a:t>
+              <a:t>10-05-24</a:t>
             </a:fld>
             <a:endParaRPr lang="en-CL"/>
           </a:p>
@@ -3154,7 +3196,7 @@
           <a:p>
             <a:fld id="{671E9371-6245-DB40-8CD7-B15A4911B4DF}" type="datetimeFigureOut">
               <a:rPr lang="en-CL" smtClean="0"/>
-              <a:t>06-05-24</a:t>
+              <a:t>10-05-24</a:t>
             </a:fld>
             <a:endParaRPr lang="en-CL"/>
           </a:p>
@@ -3397,7 +3439,7 @@
           <a:p>
             <a:fld id="{671E9371-6245-DB40-8CD7-B15A4911B4DF}" type="datetimeFigureOut">
               <a:rPr lang="en-CL" smtClean="0"/>
-              <a:t>06-05-24</a:t>
+              <a:t>10-05-24</a:t>
             </a:fld>
             <a:endParaRPr lang="en-CL"/>
           </a:p>
@@ -3940,8 +3982,8 @@
           </a:p>
         </p:txBody>
       </p:sp>
-      <mc:AlternateContent xmlns:mc="http://schemas.openxmlformats.org/markup-compatibility/2006">
-        <mc:Choice xmlns:a14="http://schemas.microsoft.com/office/drawing/2010/main" Requires="a14">
+      <mc:AlternateContent xmlns:mc="http://schemas.openxmlformats.org/markup-compatibility/2006" xmlns:a14="http://schemas.microsoft.com/office/drawing/2010/main">
+        <mc:Choice Requires="a14">
           <p:sp>
             <p:nvSpPr>
               <p:cNvPr id="3" name="Content Placeholder 2">
@@ -4355,7 +4397,7 @@
             </p:txBody>
           </p:sp>
         </mc:Choice>
-        <mc:Fallback>
+        <mc:Fallback xmlns="">
           <p:sp>
             <p:nvSpPr>
               <p:cNvPr id="3" name="Content Placeholder 2">
@@ -4540,8 +4582,8 @@
           </a:p>
         </p:txBody>
       </p:sp>
-      <mc:AlternateContent xmlns:mc="http://schemas.openxmlformats.org/markup-compatibility/2006">
-        <mc:Choice xmlns:a14="http://schemas.microsoft.com/office/drawing/2010/main" Requires="a14">
+      <mc:AlternateContent xmlns:mc="http://schemas.openxmlformats.org/markup-compatibility/2006" xmlns:a14="http://schemas.microsoft.com/office/drawing/2010/main">
+        <mc:Choice Requires="a14">
           <p:sp>
             <p:nvSpPr>
               <p:cNvPr id="3" name="Content Placeholder 2">
@@ -4652,14 +4694,7 @@
                         <a:rPr lang="es-ES" b="0" i="1" smtClean="0">
                           <a:latin typeface="Cambria Math" panose="02040503050406030204" pitchFamily="18" charset="0"/>
                         </a:rPr>
-                        <m:t> ≈0.0</m:t>
-                      </m:r>
-                      <m:r>
-                        <a:rPr lang="es-ES" b="0" i="1" smtClean="0">
-                          <a:latin typeface="Cambria Math" panose="02040503050406030204" pitchFamily="18" charset="0"/>
-                          <a:ea typeface="Cambria Math" panose="02040503050406030204" pitchFamily="18" charset="0"/>
-                        </a:rPr>
-                        <m:t>2</m:t>
+                        <m:t> ≈0.02</m:t>
                       </m:r>
                     </m:oMath>
                   </m:oMathPara>
@@ -4688,14 +4723,7 @@
                         <a:rPr lang="es-ES" b="0" i="1" smtClean="0">
                           <a:latin typeface="Cambria Math" panose="02040503050406030204" pitchFamily="18" charset="0"/>
                         </a:rPr>
-                        <m:t>=0.995 ≈0.9</m:t>
-                      </m:r>
-                      <m:r>
-                        <a:rPr lang="es-ES" b="0" i="1" smtClean="0">
-                          <a:latin typeface="Cambria Math" panose="02040503050406030204" pitchFamily="18" charset="0"/>
-                          <a:ea typeface="Cambria Math" panose="02040503050406030204" pitchFamily="18" charset="0"/>
-                        </a:rPr>
-                        <m:t>9</m:t>
+                        <m:t>=0.995 ≈0.99</m:t>
                       </m:r>
                     </m:oMath>
                   </m:oMathPara>
@@ -4713,7 +4741,7 @@
             </p:txBody>
           </p:sp>
         </mc:Choice>
-        <mc:Fallback>
+        <mc:Fallback xmlns="">
           <p:sp>
             <p:nvSpPr>
               <p:cNvPr id="3" name="Content Placeholder 2">
@@ -4841,8 +4869,8 @@
           </a:p>
         </p:txBody>
       </p:sp>
-      <mc:AlternateContent xmlns:mc="http://schemas.openxmlformats.org/markup-compatibility/2006">
-        <mc:Choice xmlns:a14="http://schemas.microsoft.com/office/drawing/2010/main" Requires="a14">
+      <mc:AlternateContent xmlns:mc="http://schemas.openxmlformats.org/markup-compatibility/2006" xmlns:a14="http://schemas.microsoft.com/office/drawing/2010/main">
+        <mc:Choice Requires="a14">
           <p:sp>
             <p:nvSpPr>
               <p:cNvPr id="3" name="Content Placeholder 2">
@@ -4940,7 +4968,7 @@
             </p:txBody>
           </p:sp>
         </mc:Choice>
-        <mc:Fallback>
+        <mc:Fallback xmlns="">
           <p:sp>
             <p:nvSpPr>
               <p:cNvPr id="3" name="Content Placeholder 2">
@@ -5291,8 +5319,8 @@
           </a:p>
         </p:txBody>
       </p:sp>
-      <mc:AlternateContent xmlns:mc="http://schemas.openxmlformats.org/markup-compatibility/2006">
-        <mc:Choice xmlns:a14="http://schemas.microsoft.com/office/drawing/2010/main" Requires="a14">
+      <mc:AlternateContent xmlns:mc="http://schemas.openxmlformats.org/markup-compatibility/2006" xmlns:a14="http://schemas.microsoft.com/office/drawing/2010/main">
+        <mc:Choice Requires="a14">
           <p:sp>
             <p:nvSpPr>
               <p:cNvPr id="3" name="Content Placeholder 2">
@@ -5473,7 +5501,7 @@
             </p:txBody>
           </p:sp>
         </mc:Choice>
-        <mc:Fallback>
+        <mc:Fallback xmlns="">
           <p:sp>
             <p:nvSpPr>
               <p:cNvPr id="3" name="Content Placeholder 2">
@@ -5635,8 +5663,8 @@
           </a:p>
         </p:txBody>
       </p:sp>
-      <mc:AlternateContent xmlns:mc="http://schemas.openxmlformats.org/markup-compatibility/2006">
-        <mc:Choice xmlns:a14="http://schemas.microsoft.com/office/drawing/2010/main" Requires="a14">
+      <mc:AlternateContent xmlns:mc="http://schemas.openxmlformats.org/markup-compatibility/2006" xmlns:a14="http://schemas.microsoft.com/office/drawing/2010/main">
+        <mc:Choice Requires="a14">
           <p:sp>
             <p:nvSpPr>
               <p:cNvPr id="3" name="Content Placeholder 2">
@@ -5778,7 +5806,7 @@
             </p:txBody>
           </p:sp>
         </mc:Choice>
-        <mc:Fallback>
+        <mc:Fallback xmlns="">
           <p:sp>
             <p:nvSpPr>
               <p:cNvPr id="3" name="Content Placeholder 2">
@@ -5966,8 +5994,8 @@
           </a:p>
         </p:txBody>
       </p:sp>
-      <mc:AlternateContent xmlns:mc="http://schemas.openxmlformats.org/markup-compatibility/2006">
-        <mc:Choice xmlns:a14="http://schemas.microsoft.com/office/drawing/2010/main" Requires="a14">
+      <mc:AlternateContent xmlns:mc="http://schemas.openxmlformats.org/markup-compatibility/2006" xmlns:a14="http://schemas.microsoft.com/office/drawing/2010/main">
+        <mc:Choice Requires="a14">
           <p:sp>
             <p:nvSpPr>
               <p:cNvPr id="3" name="Content Placeholder 2">
@@ -6080,7 +6108,7 @@
             </p:txBody>
           </p:sp>
         </mc:Choice>
-        <mc:Fallback>
+        <mc:Fallback xmlns="">
           <p:sp>
             <p:nvSpPr>
               <p:cNvPr id="3" name="Content Placeholder 2">
@@ -6213,8 +6241,8 @@
           </a:p>
         </p:txBody>
       </p:sp>
-      <mc:AlternateContent xmlns:mc="http://schemas.openxmlformats.org/markup-compatibility/2006">
-        <mc:Choice xmlns:a14="http://schemas.microsoft.com/office/drawing/2010/main" Requires="a14">
+      <mc:AlternateContent xmlns:mc="http://schemas.openxmlformats.org/markup-compatibility/2006" xmlns:a14="http://schemas.microsoft.com/office/drawing/2010/main">
+        <mc:Choice Requires="a14">
           <p:sp>
             <p:nvSpPr>
               <p:cNvPr id="3" name="Content Placeholder 2">
@@ -6673,13 +6701,7 @@
                         <a:rPr lang="en-US" b="0" i="1" smtClean="0">
                           <a:latin typeface="Cambria Math" panose="02040503050406030204" pitchFamily="18" charset="0"/>
                         </a:rPr>
-                        <m:t> </m:t>
-                      </m:r>
-                      <m:r>
-                        <a:rPr lang="en-US" b="0" i="1" smtClean="0">
-                          <a:latin typeface="Cambria Math" panose="02040503050406030204" pitchFamily="18" charset="0"/>
-                        </a:rPr>
-                        <m:t> </m:t>
+                        <m:t>  </m:t>
                       </m:r>
                     </m:oMath>
                   </m:oMathPara>
@@ -6757,7 +6779,7 @@
             </p:txBody>
           </p:sp>
         </mc:Choice>
-        <mc:Fallback>
+        <mc:Fallback xmlns="">
           <p:sp>
             <p:nvSpPr>
               <p:cNvPr id="3" name="Content Placeholder 2">
@@ -8790,8 +8812,8 @@
           </a:p>
         </p:txBody>
       </p:sp>
-      <mc:AlternateContent xmlns:mc="http://schemas.openxmlformats.org/markup-compatibility/2006">
-        <mc:Choice xmlns:a14="http://schemas.microsoft.com/office/drawing/2010/main" Requires="a14">
+      <mc:AlternateContent xmlns:mc="http://schemas.openxmlformats.org/markup-compatibility/2006" xmlns:a14="http://schemas.microsoft.com/office/drawing/2010/main">
+        <mc:Choice Requires="a14">
           <p:sp>
             <p:nvSpPr>
               <p:cNvPr id="3" name="Content Placeholder 2">
@@ -8978,7 +9000,7 @@
             </p:txBody>
           </p:sp>
         </mc:Choice>
-        <mc:Fallback>
+        <mc:Fallback xmlns="">
           <p:sp>
             <p:nvSpPr>
               <p:cNvPr id="3" name="Content Placeholder 2">
@@ -9534,8 +9556,8 @@
           </a:p>
         </p:txBody>
       </p:sp>
-      <mc:AlternateContent xmlns:mc="http://schemas.openxmlformats.org/markup-compatibility/2006">
-        <mc:Choice xmlns:a14="http://schemas.microsoft.com/office/drawing/2010/main" Requires="a14">
+      <mc:AlternateContent xmlns:mc="http://schemas.openxmlformats.org/markup-compatibility/2006" xmlns:a14="http://schemas.microsoft.com/office/drawing/2010/main">
+        <mc:Choice Requires="a14">
           <p:sp>
             <p:nvSpPr>
               <p:cNvPr id="3" name="Content Placeholder 2">
@@ -9638,7 +9660,7 @@
             </p:txBody>
           </p:sp>
         </mc:Choice>
-        <mc:Fallback>
+        <mc:Fallback xmlns="">
           <p:sp>
             <p:nvSpPr>
               <p:cNvPr id="3" name="Content Placeholder 2">
@@ -9766,8 +9788,8 @@
           </a:p>
         </p:txBody>
       </p:sp>
-      <mc:AlternateContent xmlns:mc="http://schemas.openxmlformats.org/markup-compatibility/2006">
-        <mc:Choice xmlns:a14="http://schemas.microsoft.com/office/drawing/2010/main" Requires="a14">
+      <mc:AlternateContent xmlns:mc="http://schemas.openxmlformats.org/markup-compatibility/2006" xmlns:a14="http://schemas.microsoft.com/office/drawing/2010/main">
+        <mc:Choice Requires="a14">
           <p:sp>
             <p:nvSpPr>
               <p:cNvPr id="3" name="Content Placeholder 2">
@@ -9871,7 +9893,7 @@
             </p:txBody>
           </p:sp>
         </mc:Choice>
-        <mc:Fallback>
+        <mc:Fallback xmlns="">
           <p:sp>
             <p:nvSpPr>
               <p:cNvPr id="3" name="Content Placeholder 2">
@@ -11440,8 +11462,8 @@
           </a:p>
         </p:txBody>
       </p:sp>
-      <mc:AlternateContent xmlns:mc="http://schemas.openxmlformats.org/markup-compatibility/2006">
-        <mc:Choice xmlns:a14="http://schemas.microsoft.com/office/drawing/2010/main" Requires="a14">
+      <mc:AlternateContent xmlns:mc="http://schemas.openxmlformats.org/markup-compatibility/2006" xmlns:a14="http://schemas.microsoft.com/office/drawing/2010/main">
+        <mc:Choice Requires="a14">
           <p:sp>
             <p:nvSpPr>
               <p:cNvPr id="3" name="Content Placeholder 2">
@@ -11729,7 +11751,7 @@
             </p:txBody>
           </p:sp>
         </mc:Choice>
-        <mc:Fallback>
+        <mc:Fallback xmlns="">
           <p:sp>
             <p:nvSpPr>
               <p:cNvPr id="3" name="Content Placeholder 2">

</xml_diff>